<commit_message>
[Presentation] Replace gif with video
</commit_message>
<xml_diff>
--- a/docs/presentation/Presentasjon oblig3.pptx
+++ b/docs/presentation/Presentasjon oblig3.pptx
@@ -6202,7 +6202,7 @@
                 </a14:imgProps>
               </a:ext>
               <a:ext uri="{28A0092B-C50C-407E-A947-70E740481C1C}">
-                <a14:useLocalDpi xmlns:a14="http://schemas.microsoft.com/office/drawing/2010/main" val="0"/>
+                <a14:useLocalDpi xmlns:a14="http://schemas.microsoft.com/office/drawing/2010/main"/>
               </a:ext>
             </a:extLst>
           </a:blip>
@@ -6269,7 +6269,7 @@
           <a:blip r:embed="rId3">
             <a:extLst>
               <a:ext uri="{28A0092B-C50C-407E-A947-70E740481C1C}">
-                <a14:useLocalDpi xmlns:a14="http://schemas.microsoft.com/office/drawing/2010/main" val="0"/>
+                <a14:useLocalDpi xmlns:a14="http://schemas.microsoft.com/office/drawing/2010/main"/>
               </a:ext>
             </a:extLst>
           </a:blip>
@@ -6676,7 +6676,7 @@
           <a:blip r:embed="rId4">
             <a:extLst>
               <a:ext uri="{28A0092B-C50C-407E-A947-70E740481C1C}">
-                <a14:useLocalDpi xmlns:a14="http://schemas.microsoft.com/office/drawing/2010/main" val="0"/>
+                <a14:useLocalDpi xmlns:a14="http://schemas.microsoft.com/office/drawing/2010/main"/>
               </a:ext>
             </a:extLst>
           </a:blip>
@@ -6730,7 +6730,7 @@
           <a:blip r:embed="rId4">
             <a:extLst>
               <a:ext uri="{28A0092B-C50C-407E-A947-70E740481C1C}">
-                <a14:useLocalDpi xmlns:a14="http://schemas.microsoft.com/office/drawing/2010/main" val="0"/>
+                <a14:useLocalDpi xmlns:a14="http://schemas.microsoft.com/office/drawing/2010/main"/>
               </a:ext>
             </a:extLst>
           </a:blip>
@@ -7049,7 +7049,7 @@
           <a:blip r:embed="rId5">
             <a:extLst>
               <a:ext uri="{28A0092B-C50C-407E-A947-70E740481C1C}">
-                <a14:useLocalDpi xmlns:a14="http://schemas.microsoft.com/office/drawing/2010/main" val="0"/>
+                <a14:useLocalDpi xmlns:a14="http://schemas.microsoft.com/office/drawing/2010/main"/>
               </a:ext>
             </a:extLst>
           </a:blip>
@@ -7102,10 +7102,10 @@
           <p:nvPr/>
         </p:nvPicPr>
         <p:blipFill>
-          <a:blip r:embed="rId6" cstate="print">
+          <a:blip r:embed="rId6" cstate="screen">
             <a:extLst>
               <a:ext uri="{28A0092B-C50C-407E-A947-70E740481C1C}">
-                <a14:useLocalDpi xmlns:a14="http://schemas.microsoft.com/office/drawing/2010/main" val="0"/>
+                <a14:useLocalDpi xmlns:a14="http://schemas.microsoft.com/office/drawing/2010/main"/>
               </a:ext>
             </a:extLst>
           </a:blip>
@@ -7158,10 +7158,10 @@
           <p:nvPr/>
         </p:nvPicPr>
         <p:blipFill>
-          <a:blip r:embed="rId7" cstate="print">
+          <a:blip r:embed="rId7" cstate="screen">
             <a:extLst>
               <a:ext uri="{28A0092B-C50C-407E-A947-70E740481C1C}">
-                <a14:useLocalDpi xmlns:a14="http://schemas.microsoft.com/office/drawing/2010/main" val="0"/>
+                <a14:useLocalDpi xmlns:a14="http://schemas.microsoft.com/office/drawing/2010/main"/>
               </a:ext>
             </a:extLst>
           </a:blip>
@@ -7215,7 +7215,7 @@
           <a:blip r:embed="rId8">
             <a:extLst>
               <a:ext uri="{28A0092B-C50C-407E-A947-70E740481C1C}">
-                <a14:useLocalDpi xmlns:a14="http://schemas.microsoft.com/office/drawing/2010/main" val="0"/>
+                <a14:useLocalDpi xmlns:a14="http://schemas.microsoft.com/office/drawing/2010/main"/>
               </a:ext>
             </a:extLst>
           </a:blip>
@@ -7753,7 +7753,7 @@
           <a:blip r:embed="rId3">
             <a:extLst>
               <a:ext uri="{28A0092B-C50C-407E-A947-70E740481C1C}">
-                <a14:useLocalDpi xmlns:a14="http://schemas.microsoft.com/office/drawing/2010/main" val="0"/>
+                <a14:useLocalDpi xmlns:a14="http://schemas.microsoft.com/office/drawing/2010/main"/>
               </a:ext>
             </a:extLst>
           </a:blip>
@@ -8190,7 +8190,7 @@
           <a:blip r:embed="rId4">
             <a:extLst>
               <a:ext uri="{28A0092B-C50C-407E-A947-70E740481C1C}">
-                <a14:useLocalDpi xmlns:a14="http://schemas.microsoft.com/office/drawing/2010/main" val="0"/>
+                <a14:useLocalDpi xmlns:a14="http://schemas.microsoft.com/office/drawing/2010/main"/>
               </a:ext>
             </a:extLst>
           </a:blip>
@@ -8244,7 +8244,7 @@
           <a:blip r:embed="rId4">
             <a:extLst>
               <a:ext uri="{28A0092B-C50C-407E-A947-70E740481C1C}">
-                <a14:useLocalDpi xmlns:a14="http://schemas.microsoft.com/office/drawing/2010/main" val="0"/>
+                <a14:useLocalDpi xmlns:a14="http://schemas.microsoft.com/office/drawing/2010/main"/>
               </a:ext>
             </a:extLst>
           </a:blip>
@@ -8563,7 +8563,7 @@
           <a:blip r:embed="rId5">
             <a:extLst>
               <a:ext uri="{28A0092B-C50C-407E-A947-70E740481C1C}">
-                <a14:useLocalDpi xmlns:a14="http://schemas.microsoft.com/office/drawing/2010/main" val="0"/>
+                <a14:useLocalDpi xmlns:a14="http://schemas.microsoft.com/office/drawing/2010/main"/>
               </a:ext>
             </a:extLst>
           </a:blip>
@@ -8616,10 +8616,10 @@
           <p:nvPr/>
         </p:nvPicPr>
         <p:blipFill>
-          <a:blip r:embed="rId6" cstate="print">
+          <a:blip r:embed="rId6" cstate="screen">
             <a:extLst>
               <a:ext uri="{28A0092B-C50C-407E-A947-70E740481C1C}">
-                <a14:useLocalDpi xmlns:a14="http://schemas.microsoft.com/office/drawing/2010/main" val="0"/>
+                <a14:useLocalDpi xmlns:a14="http://schemas.microsoft.com/office/drawing/2010/main"/>
               </a:ext>
             </a:extLst>
           </a:blip>
@@ -8672,10 +8672,10 @@
           <p:nvPr/>
         </p:nvPicPr>
         <p:blipFill>
-          <a:blip r:embed="rId7" cstate="print">
+          <a:blip r:embed="rId7" cstate="screen">
             <a:extLst>
               <a:ext uri="{28A0092B-C50C-407E-A947-70E740481C1C}">
-                <a14:useLocalDpi xmlns:a14="http://schemas.microsoft.com/office/drawing/2010/main" val="0"/>
+                <a14:useLocalDpi xmlns:a14="http://schemas.microsoft.com/office/drawing/2010/main"/>
               </a:ext>
             </a:extLst>
           </a:blip>
@@ -8729,7 +8729,7 @@
           <a:blip r:embed="rId8">
             <a:extLst>
               <a:ext uri="{28A0092B-C50C-407E-A947-70E740481C1C}">
-                <a14:useLocalDpi xmlns:a14="http://schemas.microsoft.com/office/drawing/2010/main" val="0"/>
+                <a14:useLocalDpi xmlns:a14="http://schemas.microsoft.com/office/drawing/2010/main"/>
               </a:ext>
             </a:extLst>
           </a:blip>
@@ -8921,7 +8921,7 @@
           <a:blip r:embed="rId3">
             <a:extLst>
               <a:ext uri="{28A0092B-C50C-407E-A947-70E740481C1C}">
-                <a14:useLocalDpi xmlns:a14="http://schemas.microsoft.com/office/drawing/2010/main" val="0"/>
+                <a14:useLocalDpi xmlns:a14="http://schemas.microsoft.com/office/drawing/2010/main"/>
               </a:ext>
             </a:extLst>
           </a:blip>
@@ -9229,7 +9229,7 @@
           <a:blip r:embed="rId4">
             <a:extLst>
               <a:ext uri="{28A0092B-C50C-407E-A947-70E740481C1C}">
-                <a14:useLocalDpi xmlns:a14="http://schemas.microsoft.com/office/drawing/2010/main" val="0"/>
+                <a14:useLocalDpi xmlns:a14="http://schemas.microsoft.com/office/drawing/2010/main"/>
               </a:ext>
             </a:extLst>
           </a:blip>
@@ -9283,7 +9283,7 @@
           <a:blip r:embed="rId4">
             <a:extLst>
               <a:ext uri="{28A0092B-C50C-407E-A947-70E740481C1C}">
-                <a14:useLocalDpi xmlns:a14="http://schemas.microsoft.com/office/drawing/2010/main" val="0"/>
+                <a14:useLocalDpi xmlns:a14="http://schemas.microsoft.com/office/drawing/2010/main"/>
               </a:ext>
             </a:extLst>
           </a:blip>
@@ -9602,7 +9602,7 @@
           <a:blip r:embed="rId5">
             <a:extLst>
               <a:ext uri="{28A0092B-C50C-407E-A947-70E740481C1C}">
-                <a14:useLocalDpi xmlns:a14="http://schemas.microsoft.com/office/drawing/2010/main" val="0"/>
+                <a14:useLocalDpi xmlns:a14="http://schemas.microsoft.com/office/drawing/2010/main"/>
               </a:ext>
             </a:extLst>
           </a:blip>
@@ -9655,10 +9655,10 @@
           <p:nvPr/>
         </p:nvPicPr>
         <p:blipFill>
-          <a:blip r:embed="rId6" cstate="print">
+          <a:blip r:embed="rId6" cstate="screen">
             <a:extLst>
               <a:ext uri="{28A0092B-C50C-407E-A947-70E740481C1C}">
-                <a14:useLocalDpi xmlns:a14="http://schemas.microsoft.com/office/drawing/2010/main" val="0"/>
+                <a14:useLocalDpi xmlns:a14="http://schemas.microsoft.com/office/drawing/2010/main"/>
               </a:ext>
             </a:extLst>
           </a:blip>
@@ -9711,10 +9711,10 @@
           <p:nvPr/>
         </p:nvPicPr>
         <p:blipFill>
-          <a:blip r:embed="rId7" cstate="print">
+          <a:blip r:embed="rId7" cstate="screen">
             <a:extLst>
               <a:ext uri="{28A0092B-C50C-407E-A947-70E740481C1C}">
-                <a14:useLocalDpi xmlns:a14="http://schemas.microsoft.com/office/drawing/2010/main" val="0"/>
+                <a14:useLocalDpi xmlns:a14="http://schemas.microsoft.com/office/drawing/2010/main"/>
               </a:ext>
             </a:extLst>
           </a:blip>
@@ -9768,7 +9768,7 @@
           <a:blip r:embed="rId8">
             <a:extLst>
               <a:ext uri="{28A0092B-C50C-407E-A947-70E740481C1C}">
-                <a14:useLocalDpi xmlns:a14="http://schemas.microsoft.com/office/drawing/2010/main" val="0"/>
+                <a14:useLocalDpi xmlns:a14="http://schemas.microsoft.com/office/drawing/2010/main"/>
               </a:ext>
             </a:extLst>
           </a:blip>
@@ -9960,7 +9960,7 @@
           <a:blip r:embed="rId3">
             <a:extLst>
               <a:ext uri="{28A0092B-C50C-407E-A947-70E740481C1C}">
-                <a14:useLocalDpi xmlns:a14="http://schemas.microsoft.com/office/drawing/2010/main" val="0"/>
+                <a14:useLocalDpi xmlns:a14="http://schemas.microsoft.com/office/drawing/2010/main"/>
               </a:ext>
             </a:extLst>
           </a:blip>
@@ -10268,7 +10268,7 @@
           <a:blip r:embed="rId4">
             <a:extLst>
               <a:ext uri="{28A0092B-C50C-407E-A947-70E740481C1C}">
-                <a14:useLocalDpi xmlns:a14="http://schemas.microsoft.com/office/drawing/2010/main" val="0"/>
+                <a14:useLocalDpi xmlns:a14="http://schemas.microsoft.com/office/drawing/2010/main"/>
               </a:ext>
             </a:extLst>
           </a:blip>
@@ -10322,7 +10322,7 @@
           <a:blip r:embed="rId4">
             <a:extLst>
               <a:ext uri="{28A0092B-C50C-407E-A947-70E740481C1C}">
-                <a14:useLocalDpi xmlns:a14="http://schemas.microsoft.com/office/drawing/2010/main" val="0"/>
+                <a14:useLocalDpi xmlns:a14="http://schemas.microsoft.com/office/drawing/2010/main"/>
               </a:ext>
             </a:extLst>
           </a:blip>
@@ -10641,7 +10641,7 @@
           <a:blip r:embed="rId5">
             <a:extLst>
               <a:ext uri="{28A0092B-C50C-407E-A947-70E740481C1C}">
-                <a14:useLocalDpi xmlns:a14="http://schemas.microsoft.com/office/drawing/2010/main" val="0"/>
+                <a14:useLocalDpi xmlns:a14="http://schemas.microsoft.com/office/drawing/2010/main"/>
               </a:ext>
             </a:extLst>
           </a:blip>
@@ -10694,10 +10694,10 @@
           <p:nvPr/>
         </p:nvPicPr>
         <p:blipFill>
-          <a:blip r:embed="rId6" cstate="print">
+          <a:blip r:embed="rId6" cstate="screen">
             <a:extLst>
               <a:ext uri="{28A0092B-C50C-407E-A947-70E740481C1C}">
-                <a14:useLocalDpi xmlns:a14="http://schemas.microsoft.com/office/drawing/2010/main" val="0"/>
+                <a14:useLocalDpi xmlns:a14="http://schemas.microsoft.com/office/drawing/2010/main"/>
               </a:ext>
             </a:extLst>
           </a:blip>
@@ -10750,10 +10750,10 @@
           <p:nvPr/>
         </p:nvPicPr>
         <p:blipFill>
-          <a:blip r:embed="rId7" cstate="print">
+          <a:blip r:embed="rId7" cstate="screen">
             <a:extLst>
               <a:ext uri="{28A0092B-C50C-407E-A947-70E740481C1C}">
-                <a14:useLocalDpi xmlns:a14="http://schemas.microsoft.com/office/drawing/2010/main" val="0"/>
+                <a14:useLocalDpi xmlns:a14="http://schemas.microsoft.com/office/drawing/2010/main"/>
               </a:ext>
             </a:extLst>
           </a:blip>
@@ -10807,7 +10807,7 @@
           <a:blip r:embed="rId8">
             <a:extLst>
               <a:ext uri="{28A0092B-C50C-407E-A947-70E740481C1C}">
-                <a14:useLocalDpi xmlns:a14="http://schemas.microsoft.com/office/drawing/2010/main" val="0"/>
+                <a14:useLocalDpi xmlns:a14="http://schemas.microsoft.com/office/drawing/2010/main"/>
               </a:ext>
             </a:extLst>
           </a:blip>
@@ -10964,7 +10964,7 @@
     <p:bg>
       <p:bgPr>
         <a:blipFill dpi="0" rotWithShape="0">
-          <a:blip r:embed="rId2"/>
+          <a:blip r:embed="rId4"/>
           <a:srcRect/>
           <a:stretch>
             <a:fillRect/>
@@ -10996,10 +10996,10 @@
           <p:nvPr/>
         </p:nvPicPr>
         <p:blipFill>
-          <a:blip r:embed="rId3">
+          <a:blip r:embed="rId5">
             <a:extLst>
               <a:ext uri="{28A0092B-C50C-407E-A947-70E740481C1C}">
-                <a14:useLocalDpi xmlns:a14="http://schemas.microsoft.com/office/drawing/2010/main" val="0"/>
+                <a14:useLocalDpi xmlns:a14="http://schemas.microsoft.com/office/drawing/2010/main"/>
               </a:ext>
             </a:extLst>
           </a:blip>
@@ -11304,10 +11304,10 @@
           <p:nvPr/>
         </p:nvPicPr>
         <p:blipFill>
-          <a:blip r:embed="rId4">
+          <a:blip r:embed="rId6">
             <a:extLst>
               <a:ext uri="{28A0092B-C50C-407E-A947-70E740481C1C}">
-                <a14:useLocalDpi xmlns:a14="http://schemas.microsoft.com/office/drawing/2010/main" val="0"/>
+                <a14:useLocalDpi xmlns:a14="http://schemas.microsoft.com/office/drawing/2010/main"/>
               </a:ext>
             </a:extLst>
           </a:blip>
@@ -11358,10 +11358,10 @@
           <p:nvPr/>
         </p:nvPicPr>
         <p:blipFill>
-          <a:blip r:embed="rId4">
+          <a:blip r:embed="rId6">
             <a:extLst>
               <a:ext uri="{28A0092B-C50C-407E-A947-70E740481C1C}">
-                <a14:useLocalDpi xmlns:a14="http://schemas.microsoft.com/office/drawing/2010/main" val="0"/>
+                <a14:useLocalDpi xmlns:a14="http://schemas.microsoft.com/office/drawing/2010/main"/>
               </a:ext>
             </a:extLst>
           </a:blip>
@@ -11672,10 +11672,10 @@
           <p:nvPr/>
         </p:nvPicPr>
         <p:blipFill>
-          <a:blip r:embed="rId5">
+          <a:blip r:embed="rId7">
             <a:extLst>
               <a:ext uri="{28A0092B-C50C-407E-A947-70E740481C1C}">
-                <a14:useLocalDpi xmlns:a14="http://schemas.microsoft.com/office/drawing/2010/main" val="0"/>
+                <a14:useLocalDpi xmlns:a14="http://schemas.microsoft.com/office/drawing/2010/main"/>
               </a:ext>
             </a:extLst>
           </a:blip>
@@ -11728,10 +11728,10 @@
           <p:nvPr/>
         </p:nvPicPr>
         <p:blipFill>
-          <a:blip r:embed="rId6" cstate="print">
+          <a:blip r:embed="rId8" cstate="screen">
             <a:extLst>
               <a:ext uri="{28A0092B-C50C-407E-A947-70E740481C1C}">
-                <a14:useLocalDpi xmlns:a14="http://schemas.microsoft.com/office/drawing/2010/main" val="0"/>
+                <a14:useLocalDpi xmlns:a14="http://schemas.microsoft.com/office/drawing/2010/main"/>
               </a:ext>
             </a:extLst>
           </a:blip>
@@ -11784,10 +11784,10 @@
           <p:nvPr/>
         </p:nvPicPr>
         <p:blipFill>
-          <a:blip r:embed="rId7" cstate="print">
+          <a:blip r:embed="rId9" cstate="screen">
             <a:extLst>
               <a:ext uri="{28A0092B-C50C-407E-A947-70E740481C1C}">
-                <a14:useLocalDpi xmlns:a14="http://schemas.microsoft.com/office/drawing/2010/main" val="0"/>
+                <a14:useLocalDpi xmlns:a14="http://schemas.microsoft.com/office/drawing/2010/main"/>
               </a:ext>
             </a:extLst>
           </a:blip>
@@ -11838,10 +11838,10 @@
           <p:nvPr/>
         </p:nvPicPr>
         <p:blipFill>
-          <a:blip r:embed="rId8">
+          <a:blip r:embed="rId10">
             <a:extLst>
               <a:ext uri="{28A0092B-C50C-407E-A947-70E740481C1C}">
-                <a14:useLocalDpi xmlns:a14="http://schemas.microsoft.com/office/drawing/2010/main" val="0"/>
+                <a14:useLocalDpi xmlns:a14="http://schemas.microsoft.com/office/drawing/2010/main"/>
               </a:ext>
             </a:extLst>
           </a:blip>
@@ -11951,34 +11951,36 @@
       </p:sp>
       <p:pic>
         <p:nvPicPr>
-          <p:cNvPr id="4" name="Bilde 3">
+          <p:cNvPr id="2" name="2018-03-22_22-15-49">
+            <a:hlinkClick r:id="" action="ppaction://media"/>
             <a:extLst>
               <a:ext uri="{FF2B5EF4-FFF2-40B4-BE49-F238E27FC236}">
-                <a16:creationId xmlns:a16="http://schemas.microsoft.com/office/drawing/2014/main" id="{533C0616-E4E7-4DE4-9BC5-7ED07C4F08E7}"/>
+                <a16:creationId xmlns:a16="http://schemas.microsoft.com/office/drawing/2014/main" id="{DF867674-6BDF-406A-A01D-E13C358DCE6E}"/>
               </a:ext>
             </a:extLst>
           </p:cNvPr>
           <p:cNvPicPr>
             <a:picLocks noChangeAspect="1"/>
           </p:cNvPicPr>
-          <p:nvPr/>
+          <p:nvPr>
+            <a:videoFile r:link="rId2"/>
+            <p:extLst>
+              <p:ext uri="{DAA4B4D4-6D71-4841-9C94-3DE7FCFB9230}">
+                <p14:media xmlns:p14="http://schemas.microsoft.com/office/powerpoint/2010/main" r:embed="rId1"/>
+              </p:ext>
+            </p:extLst>
+          </p:nvPr>
         </p:nvPicPr>
         <p:blipFill>
-          <a:blip r:embed="rId9">
-            <a:extLst>
-              <a:ext uri="{28A0092B-C50C-407E-A947-70E740481C1C}">
-                <a14:useLocalDpi xmlns:a14="http://schemas.microsoft.com/office/drawing/2010/main" val="0"/>
-              </a:ext>
-            </a:extLst>
-          </a:blip>
+          <a:blip r:embed="rId11"/>
           <a:stretch>
             <a:fillRect/>
           </a:stretch>
         </p:blipFill>
         <p:spPr>
           <a:xfrm>
-            <a:off x="1798220" y="22225"/>
-            <a:ext cx="5942132" cy="5859706"/>
+            <a:off x="233164" y="476672"/>
+            <a:ext cx="8677673" cy="4888830"/>
           </a:xfrm>
           <a:prstGeom prst="rect">
             <a:avLst/>
@@ -11995,6 +11997,141 @@
   <p:clrMapOvr>
     <a:masterClrMapping/>
   </p:clrMapOvr>
+  <p:timing>
+    <p:tnLst>
+      <p:par>
+        <p:cTn id="1" dur="indefinite" restart="never" nodeType="tmRoot">
+          <p:childTnLst>
+            <p:seq concurrent="1" nextAc="seek">
+              <p:cTn id="2" dur="indefinite" nodeType="mainSeq">
+                <p:childTnLst>
+                  <p:par>
+                    <p:cTn id="3" fill="hold">
+                      <p:stCondLst>
+                        <p:cond delay="indefinite"/>
+                      </p:stCondLst>
+                      <p:childTnLst>
+                        <p:par>
+                          <p:cTn id="4" fill="hold">
+                            <p:stCondLst>
+                              <p:cond delay="0"/>
+                            </p:stCondLst>
+                            <p:childTnLst>
+                              <p:par>
+                                <p:cTn id="5" presetID="1" presetClass="mediacall" presetSubtype="0" fill="hold" nodeType="clickEffect">
+                                  <p:stCondLst>
+                                    <p:cond delay="0"/>
+                                  </p:stCondLst>
+                                  <p:childTnLst>
+                                    <p:cmd type="call" cmd="playFrom(0.0)">
+                                      <p:cBhvr>
+                                        <p:cTn id="6" dur="28267" fill="hold"/>
+                                        <p:tgtEl>
+                                          <p:spTgt spid="2"/>
+                                        </p:tgtEl>
+                                      </p:cBhvr>
+                                    </p:cmd>
+                                  </p:childTnLst>
+                                </p:cTn>
+                              </p:par>
+                            </p:childTnLst>
+                          </p:cTn>
+                        </p:par>
+                      </p:childTnLst>
+                    </p:cTn>
+                  </p:par>
+                </p:childTnLst>
+              </p:cTn>
+              <p:prevCondLst>
+                <p:cond evt="onPrev" delay="0">
+                  <p:tgtEl>
+                    <p:sldTgt/>
+                  </p:tgtEl>
+                </p:cond>
+              </p:prevCondLst>
+              <p:nextCondLst>
+                <p:cond evt="onNext" delay="0">
+                  <p:tgtEl>
+                    <p:sldTgt/>
+                  </p:tgtEl>
+                </p:cond>
+              </p:nextCondLst>
+            </p:seq>
+            <p:video>
+              <p:cMediaNode vol="80000">
+                <p:cTn id="7" fill="hold" display="0">
+                  <p:stCondLst>
+                    <p:cond delay="indefinite"/>
+                  </p:stCondLst>
+                </p:cTn>
+                <p:tgtEl>
+                  <p:spTgt spid="2"/>
+                </p:tgtEl>
+              </p:cMediaNode>
+            </p:video>
+            <p:seq concurrent="1" nextAc="seek">
+              <p:cTn id="8" restart="whenNotActive" fill="hold" evtFilter="cancelBubble" nodeType="interactiveSeq">
+                <p:stCondLst>
+                  <p:cond evt="onClick" delay="0">
+                    <p:tgtEl>
+                      <p:spTgt spid="2"/>
+                    </p:tgtEl>
+                  </p:cond>
+                </p:stCondLst>
+                <p:endSync evt="end" delay="0">
+                  <p:rtn val="all"/>
+                </p:endSync>
+                <p:childTnLst>
+                  <p:par>
+                    <p:cTn id="9" fill="hold">
+                      <p:stCondLst>
+                        <p:cond delay="0"/>
+                      </p:stCondLst>
+                      <p:childTnLst>
+                        <p:par>
+                          <p:cTn id="10" fill="hold">
+                            <p:stCondLst>
+                              <p:cond delay="0"/>
+                            </p:stCondLst>
+                            <p:childTnLst>
+                              <p:par>
+                                <p:cTn id="11" presetID="2" presetClass="mediacall" presetSubtype="0" fill="hold" nodeType="clickEffect">
+                                  <p:stCondLst>
+                                    <p:cond delay="0"/>
+                                  </p:stCondLst>
+                                  <p:childTnLst>
+                                    <p:cmd type="call" cmd="togglePause">
+                                      <p:cBhvr>
+                                        <p:cTn id="12" dur="1" fill="hold"/>
+                                        <p:tgtEl>
+                                          <p:spTgt spid="2"/>
+                                        </p:tgtEl>
+                                      </p:cBhvr>
+                                    </p:cmd>
+                                  </p:childTnLst>
+                                </p:cTn>
+                              </p:par>
+                            </p:childTnLst>
+                          </p:cTn>
+                        </p:par>
+                      </p:childTnLst>
+                    </p:cTn>
+                  </p:par>
+                </p:childTnLst>
+              </p:cTn>
+              <p:nextCondLst>
+                <p:cond evt="onClick" delay="0">
+                  <p:tgtEl>
+                    <p:spTgt spid="2"/>
+                  </p:tgtEl>
+                </p:cond>
+              </p:nextCondLst>
+            </p:seq>
+          </p:childTnLst>
+        </p:cTn>
+      </p:par>
+    </p:tnLst>
+  </p:timing>
 </p:sld>
 </file>
 
@@ -12039,7 +12176,7 @@
           <a:blip r:embed="rId3">
             <a:extLst>
               <a:ext uri="{28A0092B-C50C-407E-A947-70E740481C1C}">
-                <a14:useLocalDpi xmlns:a14="http://schemas.microsoft.com/office/drawing/2010/main" val="0"/>
+                <a14:useLocalDpi xmlns:a14="http://schemas.microsoft.com/office/drawing/2010/main"/>
               </a:ext>
             </a:extLst>
           </a:blip>
@@ -12357,7 +12494,7 @@
           <a:blip r:embed="rId4">
             <a:extLst>
               <a:ext uri="{28A0092B-C50C-407E-A947-70E740481C1C}">
-                <a14:useLocalDpi xmlns:a14="http://schemas.microsoft.com/office/drawing/2010/main" val="0"/>
+                <a14:useLocalDpi xmlns:a14="http://schemas.microsoft.com/office/drawing/2010/main"/>
               </a:ext>
             </a:extLst>
           </a:blip>
@@ -12411,7 +12548,7 @@
           <a:blip r:embed="rId4">
             <a:extLst>
               <a:ext uri="{28A0092B-C50C-407E-A947-70E740481C1C}">
-                <a14:useLocalDpi xmlns:a14="http://schemas.microsoft.com/office/drawing/2010/main" val="0"/>
+                <a14:useLocalDpi xmlns:a14="http://schemas.microsoft.com/office/drawing/2010/main"/>
               </a:ext>
             </a:extLst>
           </a:blip>
@@ -12722,7 +12859,7 @@
           <a:blip r:embed="rId5">
             <a:extLst>
               <a:ext uri="{28A0092B-C50C-407E-A947-70E740481C1C}">
-                <a14:useLocalDpi xmlns:a14="http://schemas.microsoft.com/office/drawing/2010/main" val="0"/>
+                <a14:useLocalDpi xmlns:a14="http://schemas.microsoft.com/office/drawing/2010/main"/>
               </a:ext>
             </a:extLst>
           </a:blip>
@@ -12775,10 +12912,10 @@
           <p:nvPr/>
         </p:nvPicPr>
         <p:blipFill>
-          <a:blip r:embed="rId6" cstate="print">
+          <a:blip r:embed="rId6" cstate="screen">
             <a:extLst>
               <a:ext uri="{28A0092B-C50C-407E-A947-70E740481C1C}">
-                <a14:useLocalDpi xmlns:a14="http://schemas.microsoft.com/office/drawing/2010/main" val="0"/>
+                <a14:useLocalDpi xmlns:a14="http://schemas.microsoft.com/office/drawing/2010/main"/>
               </a:ext>
             </a:extLst>
           </a:blip>
@@ -12831,10 +12968,10 @@
           <p:nvPr/>
         </p:nvPicPr>
         <p:blipFill>
-          <a:blip r:embed="rId7" cstate="print">
+          <a:blip r:embed="rId7" cstate="screen">
             <a:extLst>
               <a:ext uri="{28A0092B-C50C-407E-A947-70E740481C1C}">
-                <a14:useLocalDpi xmlns:a14="http://schemas.microsoft.com/office/drawing/2010/main" val="0"/>
+                <a14:useLocalDpi xmlns:a14="http://schemas.microsoft.com/office/drawing/2010/main"/>
               </a:ext>
             </a:extLst>
           </a:blip>
@@ -12888,7 +13025,7 @@
           <a:blip r:embed="rId8">
             <a:extLst>
               <a:ext uri="{28A0092B-C50C-407E-A947-70E740481C1C}">
-                <a14:useLocalDpi xmlns:a14="http://schemas.microsoft.com/office/drawing/2010/main" val="0"/>
+                <a14:useLocalDpi xmlns:a14="http://schemas.microsoft.com/office/drawing/2010/main"/>
               </a:ext>
             </a:extLst>
           </a:blip>
@@ -13866,7 +14003,13 @@
           <p:nvPr/>
         </p:nvPicPr>
         <p:blipFill>
-          <a:blip r:embed="rId6"/>
+          <a:blip r:embed="rId6" cstate="screen">
+            <a:extLst>
+              <a:ext uri="{28A0092B-C50C-407E-A947-70E740481C1C}">
+                <a14:useLocalDpi xmlns:a14="http://schemas.microsoft.com/office/drawing/2010/main"/>
+              </a:ext>
+            </a:extLst>
+          </a:blip>
           <a:stretch/>
         </p:blipFill>
         <p:spPr>
@@ -14315,7 +14458,13 @@
           <p:nvPr/>
         </p:nvPicPr>
         <p:blipFill>
-          <a:blip r:embed="rId8"/>
+          <a:blip r:embed="rId8" cstate="screen">
+            <a:extLst>
+              <a:ext uri="{28A0092B-C50C-407E-A947-70E740481C1C}">
+                <a14:useLocalDpi xmlns:a14="http://schemas.microsoft.com/office/drawing/2010/main"/>
+              </a:ext>
+            </a:extLst>
+          </a:blip>
           <a:stretch/>
         </p:blipFill>
         <p:spPr>

</xml_diff>